<commit_message>
added conclusion slide and page numbers
</commit_message>
<xml_diff>
--- a/presentation/Sokonet.pptx
+++ b/presentation/Sokonet.pptx
@@ -4,6 +4,9 @@
   <p:sldMasterIdLst>
     <p:sldMasterId id="2147483756" r:id="rId1"/>
   </p:sldMasterIdLst>
+  <p:notesMasterIdLst>
+    <p:notesMasterId r:id="rId18"/>
+  </p:notesMasterIdLst>
   <p:sldIdLst>
     <p:sldId id="256" r:id="rId2"/>
     <p:sldId id="257" r:id="rId3"/>
@@ -19,7 +22,8 @@
     <p:sldId id="269" r:id="rId13"/>
     <p:sldId id="270" r:id="rId14"/>
     <p:sldId id="271" r:id="rId15"/>
-    <p:sldId id="272" r:id="rId16"/>
+    <p:sldId id="274" r:id="rId16"/>
+    <p:sldId id="272" r:id="rId17"/>
   </p:sldIdLst>
   <p:sldSz cx="9144000" cy="6858000" type="screen4x3"/>
   <p:notesSz cx="6858000" cy="9144000"/>
@@ -118,7 +122,446 @@
       </a:defRPr>
     </a:lvl9pPr>
   </p:defaultTextStyle>
+  <p:extLst>
+    <p:ext uri="{EFAFB233-063F-42B5-8137-9DF3F51BA10A}">
+      <p15:sldGuideLst xmlns:p15="http://schemas.microsoft.com/office/powerpoint/2012/main"/>
+    </p:ext>
+  </p:extLst>
 </p:presentation>
+</file>
+
+<file path=ppt/notesMasters/notesMaster1.xml><?xml version="1.0" encoding="utf-8"?>
+<p:notesMaster xmlns:a="http://schemas.openxmlformats.org/drawingml/2006/main" xmlns:r="http://schemas.openxmlformats.org/officeDocument/2006/relationships" xmlns:p="http://schemas.openxmlformats.org/presentationml/2006/main">
+  <p:cSld>
+    <p:bg>
+      <p:bgRef idx="1001">
+        <a:schemeClr val="bg1"/>
+      </p:bgRef>
+    </p:bg>
+    <p:spTree>
+      <p:nvGrpSpPr>
+        <p:cNvPr id="1" name=""/>
+        <p:cNvGrpSpPr/>
+        <p:nvPr/>
+      </p:nvGrpSpPr>
+      <p:grpSpPr>
+        <a:xfrm>
+          <a:off x="0" y="0"/>
+          <a:ext cx="0" cy="0"/>
+          <a:chOff x="0" y="0"/>
+          <a:chExt cx="0" cy="0"/>
+        </a:xfrm>
+      </p:grpSpPr>
+      <p:sp>
+        <p:nvSpPr>
+          <p:cNvPr id="2" name="Header Placeholder 1"/>
+          <p:cNvSpPr>
+            <a:spLocks noGrp="1"/>
+          </p:cNvSpPr>
+          <p:nvPr>
+            <p:ph type="hdr" sz="quarter"/>
+          </p:nvPr>
+        </p:nvSpPr>
+        <p:spPr>
+          <a:xfrm>
+            <a:off x="0" y="0"/>
+            <a:ext cx="2971800" cy="458788"/>
+          </a:xfrm>
+          <a:prstGeom prst="rect">
+            <a:avLst/>
+          </a:prstGeom>
+        </p:spPr>
+        <p:txBody>
+          <a:bodyPr vert="horz" lIns="91440" tIns="45720" rIns="91440" bIns="45720" rtlCol="0"/>
+          <a:lstStyle>
+            <a:lvl1pPr algn="l">
+              <a:defRPr sz="1200"/>
+            </a:lvl1pPr>
+          </a:lstStyle>
+          <a:p>
+            <a:endParaRPr lang="fr-FR"/>
+          </a:p>
+        </p:txBody>
+      </p:sp>
+      <p:sp>
+        <p:nvSpPr>
+          <p:cNvPr id="3" name="Date Placeholder 2"/>
+          <p:cNvSpPr>
+            <a:spLocks noGrp="1"/>
+          </p:cNvSpPr>
+          <p:nvPr>
+            <p:ph type="dt" idx="1"/>
+          </p:nvPr>
+        </p:nvSpPr>
+        <p:spPr>
+          <a:xfrm>
+            <a:off x="3884613" y="0"/>
+            <a:ext cx="2971800" cy="458788"/>
+          </a:xfrm>
+          <a:prstGeom prst="rect">
+            <a:avLst/>
+          </a:prstGeom>
+        </p:spPr>
+        <p:txBody>
+          <a:bodyPr vert="horz" lIns="91440" tIns="45720" rIns="91440" bIns="45720" rtlCol="0"/>
+          <a:lstStyle>
+            <a:lvl1pPr algn="r">
+              <a:defRPr sz="1200"/>
+            </a:lvl1pPr>
+          </a:lstStyle>
+          <a:p>
+            <a:fld id="{12A55747-296B-4D43-ADED-70804A41352C}" type="datetimeFigureOut">
+              <a:rPr lang="fr-FR" smtClean="0"/>
+              <a:t>14/06/2016</a:t>
+            </a:fld>
+            <a:endParaRPr lang="fr-FR"/>
+          </a:p>
+        </p:txBody>
+      </p:sp>
+      <p:sp>
+        <p:nvSpPr>
+          <p:cNvPr id="4" name="Slide Image Placeholder 3"/>
+          <p:cNvSpPr>
+            <a:spLocks noGrp="1" noRot="1" noChangeAspect="1"/>
+          </p:cNvSpPr>
+          <p:nvPr>
+            <p:ph type="sldImg" idx="2"/>
+          </p:nvPr>
+        </p:nvSpPr>
+        <p:spPr>
+          <a:xfrm>
+            <a:off x="1371600" y="1143000"/>
+            <a:ext cx="4114800" cy="3086100"/>
+          </a:xfrm>
+          <a:prstGeom prst="rect">
+            <a:avLst/>
+          </a:prstGeom>
+          <a:noFill/>
+          <a:ln w="12700">
+            <a:solidFill>
+              <a:prstClr val="black"/>
+            </a:solidFill>
+          </a:ln>
+        </p:spPr>
+        <p:txBody>
+          <a:bodyPr vert="horz" lIns="91440" tIns="45720" rIns="91440" bIns="45720" rtlCol="0" anchor="ctr"/>
+          <a:lstStyle/>
+          <a:p>
+            <a:endParaRPr lang="fr-FR"/>
+          </a:p>
+        </p:txBody>
+      </p:sp>
+      <p:sp>
+        <p:nvSpPr>
+          <p:cNvPr id="5" name="Notes Placeholder 4"/>
+          <p:cNvSpPr>
+            <a:spLocks noGrp="1"/>
+          </p:cNvSpPr>
+          <p:nvPr>
+            <p:ph type="body" sz="quarter" idx="3"/>
+          </p:nvPr>
+        </p:nvSpPr>
+        <p:spPr>
+          <a:xfrm>
+            <a:off x="685800" y="4400550"/>
+            <a:ext cx="5486400" cy="3600450"/>
+          </a:xfrm>
+          <a:prstGeom prst="rect">
+            <a:avLst/>
+          </a:prstGeom>
+        </p:spPr>
+        <p:txBody>
+          <a:bodyPr vert="horz" lIns="91440" tIns="45720" rIns="91440" bIns="45720" rtlCol="0"/>
+          <a:lstStyle/>
+          <a:p>
+            <a:pPr lvl="0"/>
+            <a:r>
+              <a:rPr lang="en-US" smtClean="0"/>
+              <a:t>Click to edit Master text styles</a:t>
+            </a:r>
+          </a:p>
+          <a:p>
+            <a:pPr lvl="1"/>
+            <a:r>
+              <a:rPr lang="en-US" smtClean="0"/>
+              <a:t>Second level</a:t>
+            </a:r>
+          </a:p>
+          <a:p>
+            <a:pPr lvl="2"/>
+            <a:r>
+              <a:rPr lang="en-US" smtClean="0"/>
+              <a:t>Third level</a:t>
+            </a:r>
+          </a:p>
+          <a:p>
+            <a:pPr lvl="3"/>
+            <a:r>
+              <a:rPr lang="en-US" smtClean="0"/>
+              <a:t>Fourth level</a:t>
+            </a:r>
+          </a:p>
+          <a:p>
+            <a:pPr lvl="4"/>
+            <a:r>
+              <a:rPr lang="en-US" smtClean="0"/>
+              <a:t>Fifth level</a:t>
+            </a:r>
+            <a:endParaRPr lang="fr-FR"/>
+          </a:p>
+        </p:txBody>
+      </p:sp>
+      <p:sp>
+        <p:nvSpPr>
+          <p:cNvPr id="6" name="Footer Placeholder 5"/>
+          <p:cNvSpPr>
+            <a:spLocks noGrp="1"/>
+          </p:cNvSpPr>
+          <p:nvPr>
+            <p:ph type="ftr" sz="quarter" idx="4"/>
+          </p:nvPr>
+        </p:nvSpPr>
+        <p:spPr>
+          <a:xfrm>
+            <a:off x="0" y="8685213"/>
+            <a:ext cx="2971800" cy="458787"/>
+          </a:xfrm>
+          <a:prstGeom prst="rect">
+            <a:avLst/>
+          </a:prstGeom>
+        </p:spPr>
+        <p:txBody>
+          <a:bodyPr vert="horz" lIns="91440" tIns="45720" rIns="91440" bIns="45720" rtlCol="0" anchor="b"/>
+          <a:lstStyle>
+            <a:lvl1pPr algn="l">
+              <a:defRPr sz="1200"/>
+            </a:lvl1pPr>
+          </a:lstStyle>
+          <a:p>
+            <a:endParaRPr lang="fr-FR"/>
+          </a:p>
+        </p:txBody>
+      </p:sp>
+      <p:sp>
+        <p:nvSpPr>
+          <p:cNvPr id="7" name="Slide Number Placeholder 6"/>
+          <p:cNvSpPr>
+            <a:spLocks noGrp="1"/>
+          </p:cNvSpPr>
+          <p:nvPr>
+            <p:ph type="sldNum" sz="quarter" idx="5"/>
+          </p:nvPr>
+        </p:nvSpPr>
+        <p:spPr>
+          <a:xfrm>
+            <a:off x="3884613" y="8685213"/>
+            <a:ext cx="2971800" cy="458787"/>
+          </a:xfrm>
+          <a:prstGeom prst="rect">
+            <a:avLst/>
+          </a:prstGeom>
+        </p:spPr>
+        <p:txBody>
+          <a:bodyPr vert="horz" lIns="91440" tIns="45720" rIns="91440" bIns="45720" rtlCol="0" anchor="b"/>
+          <a:lstStyle>
+            <a:lvl1pPr algn="r">
+              <a:defRPr sz="1200"/>
+            </a:lvl1pPr>
+          </a:lstStyle>
+          <a:p>
+            <a:fld id="{2A8083D5-DE23-4A00-8EE9-F3D32EC15556}" type="slidenum">
+              <a:rPr lang="fr-FR" smtClean="0"/>
+              <a:t>‹#›</a:t>
+            </a:fld>
+            <a:endParaRPr lang="fr-FR"/>
+          </a:p>
+        </p:txBody>
+      </p:sp>
+    </p:spTree>
+    <p:extLst>
+      <p:ext uri="{BB962C8B-B14F-4D97-AF65-F5344CB8AC3E}">
+        <p14:creationId xmlns:p14="http://schemas.microsoft.com/office/powerpoint/2010/main" val="3876107583"/>
+      </p:ext>
+    </p:extLst>
+  </p:cSld>
+  <p:clrMap bg1="lt1" tx1="dk1" bg2="lt2" tx2="dk2" accent1="accent1" accent2="accent2" accent3="accent3" accent4="accent4" accent5="accent5" accent6="accent6" hlink="hlink" folHlink="folHlink"/>
+  <p:notesStyle>
+    <a:lvl1pPr marL="0" algn="l" defTabSz="914400" rtl="0" eaLnBrk="1" latinLnBrk="0" hangingPunct="1">
+      <a:defRPr sz="1200" kern="1200">
+        <a:solidFill>
+          <a:schemeClr val="tx1"/>
+        </a:solidFill>
+        <a:latin typeface="+mn-lt"/>
+        <a:ea typeface="+mn-ea"/>
+        <a:cs typeface="+mn-cs"/>
+      </a:defRPr>
+    </a:lvl1pPr>
+    <a:lvl2pPr marL="457200" algn="l" defTabSz="914400" rtl="0" eaLnBrk="1" latinLnBrk="0" hangingPunct="1">
+      <a:defRPr sz="1200" kern="1200">
+        <a:solidFill>
+          <a:schemeClr val="tx1"/>
+        </a:solidFill>
+        <a:latin typeface="+mn-lt"/>
+        <a:ea typeface="+mn-ea"/>
+        <a:cs typeface="+mn-cs"/>
+      </a:defRPr>
+    </a:lvl2pPr>
+    <a:lvl3pPr marL="914400" algn="l" defTabSz="914400" rtl="0" eaLnBrk="1" latinLnBrk="0" hangingPunct="1">
+      <a:defRPr sz="1200" kern="1200">
+        <a:solidFill>
+          <a:schemeClr val="tx1"/>
+        </a:solidFill>
+        <a:latin typeface="+mn-lt"/>
+        <a:ea typeface="+mn-ea"/>
+        <a:cs typeface="+mn-cs"/>
+      </a:defRPr>
+    </a:lvl3pPr>
+    <a:lvl4pPr marL="1371600" algn="l" defTabSz="914400" rtl="0" eaLnBrk="1" latinLnBrk="0" hangingPunct="1">
+      <a:defRPr sz="1200" kern="1200">
+        <a:solidFill>
+          <a:schemeClr val="tx1"/>
+        </a:solidFill>
+        <a:latin typeface="+mn-lt"/>
+        <a:ea typeface="+mn-ea"/>
+        <a:cs typeface="+mn-cs"/>
+      </a:defRPr>
+    </a:lvl4pPr>
+    <a:lvl5pPr marL="1828800" algn="l" defTabSz="914400" rtl="0" eaLnBrk="1" latinLnBrk="0" hangingPunct="1">
+      <a:defRPr sz="1200" kern="1200">
+        <a:solidFill>
+          <a:schemeClr val="tx1"/>
+        </a:solidFill>
+        <a:latin typeface="+mn-lt"/>
+        <a:ea typeface="+mn-ea"/>
+        <a:cs typeface="+mn-cs"/>
+      </a:defRPr>
+    </a:lvl5pPr>
+    <a:lvl6pPr marL="2286000" algn="l" defTabSz="914400" rtl="0" eaLnBrk="1" latinLnBrk="0" hangingPunct="1">
+      <a:defRPr sz="1200" kern="1200">
+        <a:solidFill>
+          <a:schemeClr val="tx1"/>
+        </a:solidFill>
+        <a:latin typeface="+mn-lt"/>
+        <a:ea typeface="+mn-ea"/>
+        <a:cs typeface="+mn-cs"/>
+      </a:defRPr>
+    </a:lvl6pPr>
+    <a:lvl7pPr marL="2743200" algn="l" defTabSz="914400" rtl="0" eaLnBrk="1" latinLnBrk="0" hangingPunct="1">
+      <a:defRPr sz="1200" kern="1200">
+        <a:solidFill>
+          <a:schemeClr val="tx1"/>
+        </a:solidFill>
+        <a:latin typeface="+mn-lt"/>
+        <a:ea typeface="+mn-ea"/>
+        <a:cs typeface="+mn-cs"/>
+      </a:defRPr>
+    </a:lvl7pPr>
+    <a:lvl8pPr marL="3200400" algn="l" defTabSz="914400" rtl="0" eaLnBrk="1" latinLnBrk="0" hangingPunct="1">
+      <a:defRPr sz="1200" kern="1200">
+        <a:solidFill>
+          <a:schemeClr val="tx1"/>
+        </a:solidFill>
+        <a:latin typeface="+mn-lt"/>
+        <a:ea typeface="+mn-ea"/>
+        <a:cs typeface="+mn-cs"/>
+      </a:defRPr>
+    </a:lvl8pPr>
+    <a:lvl9pPr marL="3657600" algn="l" defTabSz="914400" rtl="0" eaLnBrk="1" latinLnBrk="0" hangingPunct="1">
+      <a:defRPr sz="1200" kern="1200">
+        <a:solidFill>
+          <a:schemeClr val="tx1"/>
+        </a:solidFill>
+        <a:latin typeface="+mn-lt"/>
+        <a:ea typeface="+mn-ea"/>
+        <a:cs typeface="+mn-cs"/>
+      </a:defRPr>
+    </a:lvl9pPr>
+  </p:notesStyle>
+</p:notesMaster>
+</file>
+
+<file path=ppt/notesSlides/notesSlide1.xml><?xml version="1.0" encoding="utf-8"?>
+<p:notes xmlns:a="http://schemas.openxmlformats.org/drawingml/2006/main" xmlns:r="http://schemas.openxmlformats.org/officeDocument/2006/relationships" xmlns:p="http://schemas.openxmlformats.org/presentationml/2006/main">
+  <p:cSld>
+    <p:spTree>
+      <p:nvGrpSpPr>
+        <p:cNvPr id="1" name=""/>
+        <p:cNvGrpSpPr/>
+        <p:nvPr/>
+      </p:nvGrpSpPr>
+      <p:grpSpPr>
+        <a:xfrm>
+          <a:off x="0" y="0"/>
+          <a:ext cx="0" cy="0"/>
+          <a:chOff x="0" y="0"/>
+          <a:chExt cx="0" cy="0"/>
+        </a:xfrm>
+      </p:grpSpPr>
+      <p:sp>
+        <p:nvSpPr>
+          <p:cNvPr id="2" name="Slide Image Placeholder 1"/>
+          <p:cNvSpPr>
+            <a:spLocks noGrp="1" noRot="1" noChangeAspect="1"/>
+          </p:cNvSpPr>
+          <p:nvPr>
+            <p:ph type="sldImg"/>
+          </p:nvPr>
+        </p:nvSpPr>
+        <p:spPr/>
+      </p:sp>
+      <p:sp>
+        <p:nvSpPr>
+          <p:cNvPr id="3" name="Notes Placeholder 2"/>
+          <p:cNvSpPr>
+            <a:spLocks noGrp="1"/>
+          </p:cNvSpPr>
+          <p:nvPr>
+            <p:ph type="body" idx="1"/>
+          </p:nvPr>
+        </p:nvSpPr>
+        <p:spPr/>
+        <p:txBody>
+          <a:bodyPr/>
+          <a:lstStyle/>
+          <a:p>
+            <a:endParaRPr lang="fr-FR"/>
+          </a:p>
+        </p:txBody>
+      </p:sp>
+      <p:sp>
+        <p:nvSpPr>
+          <p:cNvPr id="4" name="Slide Number Placeholder 3"/>
+          <p:cNvSpPr>
+            <a:spLocks noGrp="1"/>
+          </p:cNvSpPr>
+          <p:nvPr>
+            <p:ph type="sldNum" sz="quarter" idx="10"/>
+          </p:nvPr>
+        </p:nvSpPr>
+        <p:spPr/>
+        <p:txBody>
+          <a:bodyPr/>
+          <a:lstStyle/>
+          <a:p>
+            <a:fld id="{2A8083D5-DE23-4A00-8EE9-F3D32EC15556}" type="slidenum">
+              <a:rPr lang="fr-FR" smtClean="0"/>
+              <a:t>1</a:t>
+            </a:fld>
+            <a:endParaRPr lang="fr-FR"/>
+          </a:p>
+        </p:txBody>
+      </p:sp>
+    </p:spTree>
+    <p:extLst>
+      <p:ext uri="{BB962C8B-B14F-4D97-AF65-F5344CB8AC3E}">
+        <p14:creationId xmlns:p14="http://schemas.microsoft.com/office/powerpoint/2010/main" val="941034053"/>
+      </p:ext>
+    </p:extLst>
+  </p:cSld>
+  <p:clrMapOvr>
+    <a:masterClrMapping/>
+  </p:clrMapOvr>
+</p:notes>
 </file>
 
 <file path=ppt/slideLayouts/slideLayout1.xml><?xml version="1.0" encoding="utf-8"?>
@@ -250,9 +693,9 @@
           <a:bodyPr/>
           <a:lstStyle/>
           <a:p>
-            <a:fld id="{04F7D39F-1A72-42D0-8040-B0731CD0F961}" type="datetimeFigureOut">
+            <a:fld id="{453A4FE6-C6C7-4527-8300-E537A79C1767}" type="datetime1">
               <a:rPr lang="fr-CH" smtClean="0"/>
-              <a:t>13.06.2016</a:t>
+              <a:t>14.06.2016</a:t>
             </a:fld>
             <a:endParaRPr lang="fr-CH"/>
           </a:p>
@@ -420,9 +863,9 @@
           <a:bodyPr/>
           <a:lstStyle/>
           <a:p>
-            <a:fld id="{04F7D39F-1A72-42D0-8040-B0731CD0F961}" type="datetimeFigureOut">
+            <a:fld id="{5CFA340D-6B45-4A31-AEAB-53C4D7CC1D04}" type="datetime1">
               <a:rPr lang="fr-CH" smtClean="0"/>
-              <a:t>13.06.2016</a:t>
+              <a:t>14.06.2016</a:t>
             </a:fld>
             <a:endParaRPr lang="fr-CH"/>
           </a:p>
@@ -600,9 +1043,9 @@
           <a:bodyPr/>
           <a:lstStyle/>
           <a:p>
-            <a:fld id="{04F7D39F-1A72-42D0-8040-B0731CD0F961}" type="datetimeFigureOut">
+            <a:fld id="{0A681BAE-D967-4562-B10D-BD727E5F3A73}" type="datetime1">
               <a:rPr lang="fr-CH" smtClean="0"/>
-              <a:t>13.06.2016</a:t>
+              <a:t>14.06.2016</a:t>
             </a:fld>
             <a:endParaRPr lang="fr-CH"/>
           </a:p>
@@ -770,9 +1213,9 @@
           <a:bodyPr/>
           <a:lstStyle/>
           <a:p>
-            <a:fld id="{04F7D39F-1A72-42D0-8040-B0731CD0F961}" type="datetimeFigureOut">
+            <a:fld id="{0F1D21DF-2316-4D6F-8437-275FF2E0AEDE}" type="datetime1">
               <a:rPr lang="fr-CH" smtClean="0"/>
-              <a:t>13.06.2016</a:t>
+              <a:t>14.06.2016</a:t>
             </a:fld>
             <a:endParaRPr lang="fr-CH"/>
           </a:p>
@@ -1014,9 +1457,9 @@
           <a:bodyPr/>
           <a:lstStyle/>
           <a:p>
-            <a:fld id="{04F7D39F-1A72-42D0-8040-B0731CD0F961}" type="datetimeFigureOut">
+            <a:fld id="{87C16873-1281-4D67-BCDB-54BD7A03F91C}" type="datetime1">
               <a:rPr lang="fr-CH" smtClean="0"/>
-              <a:t>13.06.2016</a:t>
+              <a:t>14.06.2016</a:t>
             </a:fld>
             <a:endParaRPr lang="fr-CH"/>
           </a:p>
@@ -1246,9 +1689,9 @@
           <a:bodyPr/>
           <a:lstStyle/>
           <a:p>
-            <a:fld id="{04F7D39F-1A72-42D0-8040-B0731CD0F961}" type="datetimeFigureOut">
+            <a:fld id="{5A9B6CA2-5984-417A-9B60-20C2451283FE}" type="datetime1">
               <a:rPr lang="fr-CH" smtClean="0"/>
-              <a:t>13.06.2016</a:t>
+              <a:t>14.06.2016</a:t>
             </a:fld>
             <a:endParaRPr lang="fr-CH"/>
           </a:p>
@@ -1620,9 +2063,9 @@
           <a:bodyPr/>
           <a:lstStyle/>
           <a:p>
-            <a:fld id="{04F7D39F-1A72-42D0-8040-B0731CD0F961}" type="datetimeFigureOut">
+            <a:fld id="{3895AD71-255F-410C-AACE-6A55E01071DA}" type="datetime1">
               <a:rPr lang="fr-CH" smtClean="0"/>
-              <a:t>13.06.2016</a:t>
+              <a:t>14.06.2016</a:t>
             </a:fld>
             <a:endParaRPr lang="fr-CH"/>
           </a:p>
@@ -1738,9 +2181,9 @@
           <a:bodyPr/>
           <a:lstStyle/>
           <a:p>
-            <a:fld id="{04F7D39F-1A72-42D0-8040-B0731CD0F961}" type="datetimeFigureOut">
+            <a:fld id="{56762F9F-AFF2-4929-922C-B71343A39F32}" type="datetime1">
               <a:rPr lang="fr-CH" smtClean="0"/>
-              <a:t>13.06.2016</a:t>
+              <a:t>14.06.2016</a:t>
             </a:fld>
             <a:endParaRPr lang="fr-CH"/>
           </a:p>
@@ -1833,9 +2276,9 @@
           <a:bodyPr/>
           <a:lstStyle/>
           <a:p>
-            <a:fld id="{04F7D39F-1A72-42D0-8040-B0731CD0F961}" type="datetimeFigureOut">
+            <a:fld id="{F82FDF0E-969B-4887-9507-161CA6EAD3B4}" type="datetime1">
               <a:rPr lang="fr-CH" smtClean="0"/>
-              <a:t>13.06.2016</a:t>
+              <a:t>14.06.2016</a:t>
             </a:fld>
             <a:endParaRPr lang="fr-CH"/>
           </a:p>
@@ -2110,9 +2553,9 @@
           <a:bodyPr/>
           <a:lstStyle/>
           <a:p>
-            <a:fld id="{04F7D39F-1A72-42D0-8040-B0731CD0F961}" type="datetimeFigureOut">
+            <a:fld id="{51DAB8C5-53F7-4105-BDAE-1D3B43E09A63}" type="datetime1">
               <a:rPr lang="fr-CH" smtClean="0"/>
-              <a:t>13.06.2016</a:t>
+              <a:t>14.06.2016</a:t>
             </a:fld>
             <a:endParaRPr lang="fr-CH"/>
           </a:p>
@@ -2367,9 +2810,9 @@
           <a:bodyPr/>
           <a:lstStyle/>
           <a:p>
-            <a:fld id="{04F7D39F-1A72-42D0-8040-B0731CD0F961}" type="datetimeFigureOut">
+            <a:fld id="{C9239A65-D616-4CE3-9442-30910B2B5449}" type="datetime1">
               <a:rPr lang="fr-CH" smtClean="0"/>
-              <a:t>13.06.2016</a:t>
+              <a:t>14.06.2016</a:t>
             </a:fld>
             <a:endParaRPr lang="fr-CH"/>
           </a:p>
@@ -2580,9 +3023,9 @@
             </a:lvl1pPr>
           </a:lstStyle>
           <a:p>
-            <a:fld id="{04F7D39F-1A72-42D0-8040-B0731CD0F961}" type="datetimeFigureOut">
+            <a:fld id="{554B110F-0DB7-4ABA-A479-F44C033F2438}" type="datetime1">
               <a:rPr lang="fr-CH" smtClean="0"/>
-              <a:t>13.06.2016</a:t>
+              <a:t>14.06.2016</a:t>
             </a:fld>
             <a:endParaRPr lang="fr-CH"/>
           </a:p>
@@ -2694,6 +3137,7 @@
       </p:par>
     </p:tnLst>
   </p:timing>
+  <p:hf hdr="0" ftr="0" dt="0"/>
   <p:txStyles>
     <p:titleStyle>
       <a:lvl1pPr algn="l" defTabSz="914400" rtl="0" eaLnBrk="1" latinLnBrk="0" hangingPunct="1">
@@ -3108,6 +3552,29 @@
           </a:p>
         </p:txBody>
       </p:sp>
+      <p:sp>
+        <p:nvSpPr>
+          <p:cNvPr id="5" name="Slide Number Placeholder 4"/>
+          <p:cNvSpPr>
+            <a:spLocks noGrp="1"/>
+          </p:cNvSpPr>
+          <p:nvPr>
+            <p:ph type="sldNum" sz="quarter" idx="12"/>
+          </p:nvPr>
+        </p:nvSpPr>
+        <p:spPr/>
+        <p:txBody>
+          <a:bodyPr/>
+          <a:lstStyle/>
+          <a:p>
+            <a:fld id="{1F97A879-0BB1-4454-9264-CAA9D1A8BE2F}" type="slidenum">
+              <a:rPr lang="fr-CH" smtClean="0"/>
+              <a:t>1</a:t>
+            </a:fld>
+            <a:endParaRPr lang="fr-CH"/>
+          </a:p>
+        </p:txBody>
+      </p:sp>
     </p:spTree>
     <p:extLst>
       <p:ext uri="{BB962C8B-B14F-4D97-AF65-F5344CB8AC3E}">
@@ -3192,6 +3659,29 @@
           </a:p>
         </p:txBody>
       </p:sp>
+      <p:sp>
+        <p:nvSpPr>
+          <p:cNvPr id="2" name="Slide Number Placeholder 1"/>
+          <p:cNvSpPr>
+            <a:spLocks noGrp="1"/>
+          </p:cNvSpPr>
+          <p:nvPr>
+            <p:ph type="sldNum" sz="quarter" idx="12"/>
+          </p:nvPr>
+        </p:nvSpPr>
+        <p:spPr/>
+        <p:txBody>
+          <a:bodyPr/>
+          <a:lstStyle/>
+          <a:p>
+            <a:fld id="{1F97A879-0BB1-4454-9264-CAA9D1A8BE2F}" type="slidenum">
+              <a:rPr lang="fr-CH" smtClean="0"/>
+              <a:t>10</a:t>
+            </a:fld>
+            <a:endParaRPr lang="fr-CH"/>
+          </a:p>
+        </p:txBody>
+      </p:sp>
     </p:spTree>
     <p:extLst>
       <p:ext uri="{BB962C8B-B14F-4D97-AF65-F5344CB8AC3E}">
@@ -3335,6 +3825,29 @@
           </a:p>
         </p:txBody>
       </p:sp>
+      <p:sp>
+        <p:nvSpPr>
+          <p:cNvPr id="2" name="Slide Number Placeholder 1"/>
+          <p:cNvSpPr>
+            <a:spLocks noGrp="1"/>
+          </p:cNvSpPr>
+          <p:nvPr>
+            <p:ph type="sldNum" sz="quarter" idx="12"/>
+          </p:nvPr>
+        </p:nvSpPr>
+        <p:spPr/>
+        <p:txBody>
+          <a:bodyPr/>
+          <a:lstStyle/>
+          <a:p>
+            <a:fld id="{1F97A879-0BB1-4454-9264-CAA9D1A8BE2F}" type="slidenum">
+              <a:rPr lang="fr-CH" smtClean="0"/>
+              <a:t>11</a:t>
+            </a:fld>
+            <a:endParaRPr lang="fr-CH"/>
+          </a:p>
+        </p:txBody>
+      </p:sp>
     </p:spTree>
     <p:extLst>
       <p:ext uri="{BB962C8B-B14F-4D97-AF65-F5344CB8AC3E}">
@@ -3518,6 +4031,29 @@
           </a:xfrm>
         </p:spPr>
       </p:pic>
+      <p:sp>
+        <p:nvSpPr>
+          <p:cNvPr id="3" name="Slide Number Placeholder 2"/>
+          <p:cNvSpPr>
+            <a:spLocks noGrp="1"/>
+          </p:cNvSpPr>
+          <p:nvPr>
+            <p:ph type="sldNum" sz="quarter" idx="12"/>
+          </p:nvPr>
+        </p:nvSpPr>
+        <p:spPr/>
+        <p:txBody>
+          <a:bodyPr/>
+          <a:lstStyle/>
+          <a:p>
+            <a:fld id="{1F97A879-0BB1-4454-9264-CAA9D1A8BE2F}" type="slidenum">
+              <a:rPr lang="fr-CH" smtClean="0"/>
+              <a:t>12</a:t>
+            </a:fld>
+            <a:endParaRPr lang="fr-CH"/>
+          </a:p>
+        </p:txBody>
+      </p:sp>
     </p:spTree>
     <p:extLst>
       <p:ext uri="{BB962C8B-B14F-4D97-AF65-F5344CB8AC3E}">
@@ -3708,6 +4244,29 @@
           </a:prstGeom>
         </p:spPr>
       </p:pic>
+      <p:sp>
+        <p:nvSpPr>
+          <p:cNvPr id="4" name="Slide Number Placeholder 3"/>
+          <p:cNvSpPr>
+            <a:spLocks noGrp="1"/>
+          </p:cNvSpPr>
+          <p:nvPr>
+            <p:ph type="sldNum" sz="quarter" idx="12"/>
+          </p:nvPr>
+        </p:nvSpPr>
+        <p:spPr/>
+        <p:txBody>
+          <a:bodyPr/>
+          <a:lstStyle/>
+          <a:p>
+            <a:fld id="{1F97A879-0BB1-4454-9264-CAA9D1A8BE2F}" type="slidenum">
+              <a:rPr lang="fr-CH" smtClean="0"/>
+              <a:t>13</a:t>
+            </a:fld>
+            <a:endParaRPr lang="fr-CH"/>
+          </a:p>
+        </p:txBody>
+      </p:sp>
     </p:spTree>
     <p:extLst>
       <p:ext uri="{BB962C8B-B14F-4D97-AF65-F5344CB8AC3E}">
@@ -3812,6 +4371,29 @@
           </a:prstGeom>
         </p:spPr>
       </p:pic>
+      <p:sp>
+        <p:nvSpPr>
+          <p:cNvPr id="3" name="Slide Number Placeholder 2"/>
+          <p:cNvSpPr>
+            <a:spLocks noGrp="1"/>
+          </p:cNvSpPr>
+          <p:nvPr>
+            <p:ph type="sldNum" sz="quarter" idx="12"/>
+          </p:nvPr>
+        </p:nvSpPr>
+        <p:spPr/>
+        <p:txBody>
+          <a:bodyPr/>
+          <a:lstStyle/>
+          <a:p>
+            <a:fld id="{1F97A879-0BB1-4454-9264-CAA9D1A8BE2F}" type="slidenum">
+              <a:rPr lang="fr-CH" smtClean="0"/>
+              <a:t>14</a:t>
+            </a:fld>
+            <a:endParaRPr lang="fr-CH"/>
+          </a:p>
+        </p:txBody>
+      </p:sp>
     </p:spTree>
     <p:extLst>
       <p:ext uri="{BB962C8B-B14F-4D97-AF65-F5344CB8AC3E}">
@@ -3851,6 +4433,125 @@
       </p:grpSpPr>
       <p:sp>
         <p:nvSpPr>
+          <p:cNvPr id="2" name="Title 1"/>
+          <p:cNvSpPr>
+            <a:spLocks noGrp="1"/>
+          </p:cNvSpPr>
+          <p:nvPr>
+            <p:ph type="title"/>
+          </p:nvPr>
+        </p:nvSpPr>
+        <p:spPr/>
+        <p:txBody>
+          <a:bodyPr/>
+          <a:lstStyle/>
+          <a:p>
+            <a:r>
+              <a:rPr lang="fr-FR" dirty="0" smtClean="0"/>
+              <a:t>Conclusion</a:t>
+            </a:r>
+            <a:endParaRPr lang="fr-FR" dirty="0">
+              <a:solidFill>
+                <a:schemeClr val="tx1">
+                  <a:lumMod val="50000"/>
+                  <a:lumOff val="50000"/>
+                </a:schemeClr>
+              </a:solidFill>
+            </a:endParaRPr>
+          </a:p>
+        </p:txBody>
+      </p:sp>
+      <p:sp>
+        <p:nvSpPr>
+          <p:cNvPr id="3" name="Content Placeholder 2"/>
+          <p:cNvSpPr>
+            <a:spLocks noGrp="1"/>
+          </p:cNvSpPr>
+          <p:nvPr>
+            <p:ph idx="1"/>
+          </p:nvPr>
+        </p:nvSpPr>
+        <p:spPr/>
+        <p:txBody>
+          <a:bodyPr/>
+          <a:lstStyle/>
+          <a:p>
+            <a:r>
+              <a:rPr lang="fr-FR" dirty="0" err="1" smtClean="0"/>
+              <a:t>Lambdas</a:t>
+            </a:r>
+            <a:r>
+              <a:rPr lang="fr-FR" dirty="0" smtClean="0"/>
+              <a:t> et pattern « commande »</a:t>
+            </a:r>
+          </a:p>
+          <a:p>
+            <a:endParaRPr lang="fr-FR" dirty="0"/>
+          </a:p>
+        </p:txBody>
+      </p:sp>
+      <p:sp>
+        <p:nvSpPr>
+          <p:cNvPr id="4" name="Slide Number Placeholder 3"/>
+          <p:cNvSpPr>
+            <a:spLocks noGrp="1"/>
+          </p:cNvSpPr>
+          <p:nvPr>
+            <p:ph type="sldNum" sz="quarter" idx="12"/>
+          </p:nvPr>
+        </p:nvSpPr>
+        <p:spPr/>
+        <p:txBody>
+          <a:bodyPr/>
+          <a:lstStyle/>
+          <a:p>
+            <a:fld id="{1F97A879-0BB1-4454-9264-CAA9D1A8BE2F}" type="slidenum">
+              <a:rPr lang="fr-CH" smtClean="0"/>
+              <a:t>15</a:t>
+            </a:fld>
+            <a:endParaRPr lang="fr-CH"/>
+          </a:p>
+        </p:txBody>
+      </p:sp>
+    </p:spTree>
+    <p:extLst>
+      <p:ext uri="{BB962C8B-B14F-4D97-AF65-F5344CB8AC3E}">
+        <p14:creationId xmlns:p14="http://schemas.microsoft.com/office/powerpoint/2010/main" val="2450968291"/>
+      </p:ext>
+    </p:extLst>
+  </p:cSld>
+  <p:clrMapOvr>
+    <a:masterClrMapping/>
+  </p:clrMapOvr>
+  <p:timing>
+    <p:tnLst>
+      <p:par>
+        <p:cTn id="1" dur="indefinite" restart="never" nodeType="tmRoot"/>
+      </p:par>
+    </p:tnLst>
+  </p:timing>
+</p:sld>
+</file>
+
+<file path=ppt/slides/slide16.xml><?xml version="1.0" encoding="utf-8"?>
+<p:sld xmlns:a="http://schemas.openxmlformats.org/drawingml/2006/main" xmlns:r="http://schemas.openxmlformats.org/officeDocument/2006/relationships" xmlns:p="http://schemas.openxmlformats.org/presentationml/2006/main">
+  <p:cSld>
+    <p:spTree>
+      <p:nvGrpSpPr>
+        <p:cNvPr id="1" name=""/>
+        <p:cNvGrpSpPr/>
+        <p:nvPr/>
+      </p:nvGrpSpPr>
+      <p:grpSpPr>
+        <a:xfrm>
+          <a:off x="0" y="0"/>
+          <a:ext cx="0" cy="0"/>
+          <a:chOff x="0" y="0"/>
+          <a:chExt cx="0" cy="0"/>
+        </a:xfrm>
+      </p:grpSpPr>
+      <p:sp>
+        <p:nvSpPr>
           <p:cNvPr id="4" name="Title 3"/>
           <p:cNvSpPr>
             <a:spLocks noGrp="1"/>
@@ -3874,6 +4575,29 @@
               <a:t>Questions ?</a:t>
             </a:r>
             <a:endParaRPr lang="fr-FR" dirty="0"/>
+          </a:p>
+        </p:txBody>
+      </p:sp>
+      <p:sp>
+        <p:nvSpPr>
+          <p:cNvPr id="2" name="Slide Number Placeholder 1"/>
+          <p:cNvSpPr>
+            <a:spLocks noGrp="1"/>
+          </p:cNvSpPr>
+          <p:nvPr>
+            <p:ph type="sldNum" sz="quarter" idx="12"/>
+          </p:nvPr>
+        </p:nvSpPr>
+        <p:spPr/>
+        <p:txBody>
+          <a:bodyPr/>
+          <a:lstStyle/>
+          <a:p>
+            <a:fld id="{1F97A879-0BB1-4454-9264-CAA9D1A8BE2F}" type="slidenum">
+              <a:rPr lang="fr-CH" smtClean="0"/>
+              <a:t>16</a:t>
+            </a:fld>
+            <a:endParaRPr lang="fr-CH"/>
           </a:p>
         </p:txBody>
       </p:sp>
@@ -3979,6 +4703,29 @@
           </a:extLst>
         </p:spPr>
       </p:pic>
+      <p:sp>
+        <p:nvSpPr>
+          <p:cNvPr id="3" name="Slide Number Placeholder 2"/>
+          <p:cNvSpPr>
+            <a:spLocks noGrp="1"/>
+          </p:cNvSpPr>
+          <p:nvPr>
+            <p:ph type="sldNum" sz="quarter" idx="12"/>
+          </p:nvPr>
+        </p:nvSpPr>
+        <p:spPr/>
+        <p:txBody>
+          <a:bodyPr/>
+          <a:lstStyle/>
+          <a:p>
+            <a:fld id="{1F97A879-0BB1-4454-9264-CAA9D1A8BE2F}" type="slidenum">
+              <a:rPr lang="fr-CH" smtClean="0"/>
+              <a:t>2</a:t>
+            </a:fld>
+            <a:endParaRPr lang="fr-CH"/>
+          </a:p>
+        </p:txBody>
+      </p:sp>
     </p:spTree>
     <p:extLst>
       <p:ext uri="{BB962C8B-B14F-4D97-AF65-F5344CB8AC3E}">
@@ -4072,6 +4819,29 @@
           </a:effectLst>
         </p:spPr>
       </p:pic>
+      <p:sp>
+        <p:nvSpPr>
+          <p:cNvPr id="3" name="Slide Number Placeholder 2"/>
+          <p:cNvSpPr>
+            <a:spLocks noGrp="1"/>
+          </p:cNvSpPr>
+          <p:nvPr>
+            <p:ph type="sldNum" sz="quarter" idx="12"/>
+          </p:nvPr>
+        </p:nvSpPr>
+        <p:spPr/>
+        <p:txBody>
+          <a:bodyPr/>
+          <a:lstStyle/>
+          <a:p>
+            <a:fld id="{1F97A879-0BB1-4454-9264-CAA9D1A8BE2F}" type="slidenum">
+              <a:rPr lang="fr-CH" smtClean="0"/>
+              <a:t>3</a:t>
+            </a:fld>
+            <a:endParaRPr lang="fr-CH"/>
+          </a:p>
+        </p:txBody>
+      </p:sp>
     </p:spTree>
     <p:extLst>
       <p:ext uri="{BB962C8B-B14F-4D97-AF65-F5344CB8AC3E}">
@@ -4212,6 +4982,29 @@
           </a:p>
         </p:txBody>
       </p:sp>
+      <p:sp>
+        <p:nvSpPr>
+          <p:cNvPr id="3" name="Slide Number Placeholder 2"/>
+          <p:cNvSpPr>
+            <a:spLocks noGrp="1"/>
+          </p:cNvSpPr>
+          <p:nvPr>
+            <p:ph type="sldNum" sz="quarter" idx="12"/>
+          </p:nvPr>
+        </p:nvSpPr>
+        <p:spPr/>
+        <p:txBody>
+          <a:bodyPr/>
+          <a:lstStyle/>
+          <a:p>
+            <a:fld id="{1F97A879-0BB1-4454-9264-CAA9D1A8BE2F}" type="slidenum">
+              <a:rPr lang="fr-CH" smtClean="0"/>
+              <a:t>4</a:t>
+            </a:fld>
+            <a:endParaRPr lang="fr-CH"/>
+          </a:p>
+        </p:txBody>
+      </p:sp>
     </p:spTree>
     <p:extLst>
       <p:ext uri="{BB962C8B-B14F-4D97-AF65-F5344CB8AC3E}">
@@ -4358,6 +5151,29 @@
           <a:effectLst/>
         </p:spPr>
       </p:pic>
+      <p:sp>
+        <p:nvSpPr>
+          <p:cNvPr id="4" name="Slide Number Placeholder 3"/>
+          <p:cNvSpPr>
+            <a:spLocks noGrp="1"/>
+          </p:cNvSpPr>
+          <p:nvPr>
+            <p:ph type="sldNum" sz="quarter" idx="12"/>
+          </p:nvPr>
+        </p:nvSpPr>
+        <p:spPr/>
+        <p:txBody>
+          <a:bodyPr/>
+          <a:lstStyle/>
+          <a:p>
+            <a:fld id="{1F97A879-0BB1-4454-9264-CAA9D1A8BE2F}" type="slidenum">
+              <a:rPr lang="fr-CH" smtClean="0"/>
+              <a:t>5</a:t>
+            </a:fld>
+            <a:endParaRPr lang="fr-CH"/>
+          </a:p>
+        </p:txBody>
+      </p:sp>
     </p:spTree>
     <p:extLst>
       <p:ext uri="{BB962C8B-B14F-4D97-AF65-F5344CB8AC3E}">
@@ -4583,6 +5399,29 @@
           </a:prstGeom>
         </p:spPr>
       </p:pic>
+      <p:sp>
+        <p:nvSpPr>
+          <p:cNvPr id="4" name="Slide Number Placeholder 3"/>
+          <p:cNvSpPr>
+            <a:spLocks noGrp="1"/>
+          </p:cNvSpPr>
+          <p:nvPr>
+            <p:ph type="sldNum" sz="quarter" idx="12"/>
+          </p:nvPr>
+        </p:nvSpPr>
+        <p:spPr/>
+        <p:txBody>
+          <a:bodyPr/>
+          <a:lstStyle/>
+          <a:p>
+            <a:fld id="{1F97A879-0BB1-4454-9264-CAA9D1A8BE2F}" type="slidenum">
+              <a:rPr lang="fr-CH" smtClean="0"/>
+              <a:t>6</a:t>
+            </a:fld>
+            <a:endParaRPr lang="fr-CH"/>
+          </a:p>
+        </p:txBody>
+      </p:sp>
     </p:spTree>
     <p:extLst>
       <p:ext uri="{BB962C8B-B14F-4D97-AF65-F5344CB8AC3E}">
@@ -4728,6 +5567,29 @@
           </a:p>
         </p:txBody>
       </p:sp>
+      <p:sp>
+        <p:nvSpPr>
+          <p:cNvPr id="2" name="Slide Number Placeholder 1"/>
+          <p:cNvSpPr>
+            <a:spLocks noGrp="1"/>
+          </p:cNvSpPr>
+          <p:nvPr>
+            <p:ph type="sldNum" sz="quarter" idx="12"/>
+          </p:nvPr>
+        </p:nvSpPr>
+        <p:spPr/>
+        <p:txBody>
+          <a:bodyPr/>
+          <a:lstStyle/>
+          <a:p>
+            <a:fld id="{1F97A879-0BB1-4454-9264-CAA9D1A8BE2F}" type="slidenum">
+              <a:rPr lang="fr-CH" smtClean="0"/>
+              <a:t>7</a:t>
+            </a:fld>
+            <a:endParaRPr lang="fr-CH"/>
+          </a:p>
+        </p:txBody>
+      </p:sp>
     </p:spTree>
     <p:extLst>
       <p:ext uri="{BB962C8B-B14F-4D97-AF65-F5344CB8AC3E}">
@@ -4814,6 +5676,29 @@
           </a:prstGeom>
         </p:spPr>
       </p:pic>
+      <p:sp>
+        <p:nvSpPr>
+          <p:cNvPr id="3" name="Slide Number Placeholder 2"/>
+          <p:cNvSpPr>
+            <a:spLocks noGrp="1"/>
+          </p:cNvSpPr>
+          <p:nvPr>
+            <p:ph type="sldNum" sz="quarter" idx="12"/>
+          </p:nvPr>
+        </p:nvSpPr>
+        <p:spPr/>
+        <p:txBody>
+          <a:bodyPr/>
+          <a:lstStyle/>
+          <a:p>
+            <a:fld id="{1F97A879-0BB1-4454-9264-CAA9D1A8BE2F}" type="slidenum">
+              <a:rPr lang="fr-CH" smtClean="0"/>
+              <a:t>8</a:t>
+            </a:fld>
+            <a:endParaRPr lang="fr-CH"/>
+          </a:p>
+        </p:txBody>
+      </p:sp>
     </p:spTree>
     <p:extLst>
       <p:ext uri="{BB962C8B-B14F-4D97-AF65-F5344CB8AC3E}">
@@ -4900,6 +5785,29 @@
           </a:prstGeom>
         </p:spPr>
       </p:pic>
+      <p:sp>
+        <p:nvSpPr>
+          <p:cNvPr id="3" name="Slide Number Placeholder 2"/>
+          <p:cNvSpPr>
+            <a:spLocks noGrp="1"/>
+          </p:cNvSpPr>
+          <p:nvPr>
+            <p:ph type="sldNum" sz="quarter" idx="12"/>
+          </p:nvPr>
+        </p:nvSpPr>
+        <p:spPr/>
+        <p:txBody>
+          <a:bodyPr/>
+          <a:lstStyle/>
+          <a:p>
+            <a:fld id="{1F97A879-0BB1-4454-9264-CAA9D1A8BE2F}" type="slidenum">
+              <a:rPr lang="fr-CH" smtClean="0"/>
+              <a:t>9</a:t>
+            </a:fld>
+            <a:endParaRPr lang="fr-CH"/>
+          </a:p>
+        </p:txBody>
+      </p:sp>
     </p:spTree>
     <p:extLst>
       <p:ext uri="{BB962C8B-B14F-4D97-AF65-F5344CB8AC3E}">
@@ -5179,4 +6087,265 @@
     </a:ext>
   </a:extLst>
 </a:theme>
+</file>
+
+<file path=ppt/theme/theme2.xml><?xml version="1.0" encoding="utf-8"?>
+<a:theme xmlns:a="http://schemas.openxmlformats.org/drawingml/2006/main" name="Office Theme">
+  <a:themeElements>
+    <a:clrScheme name="Office">
+      <a:dk1>
+        <a:sysClr val="windowText" lastClr="000000"/>
+      </a:dk1>
+      <a:lt1>
+        <a:sysClr val="window" lastClr="FFFFFF"/>
+      </a:lt1>
+      <a:dk2>
+        <a:srgbClr val="44546A"/>
+      </a:dk2>
+      <a:lt2>
+        <a:srgbClr val="E7E6E6"/>
+      </a:lt2>
+      <a:accent1>
+        <a:srgbClr val="5B9BD5"/>
+      </a:accent1>
+      <a:accent2>
+        <a:srgbClr val="ED7D31"/>
+      </a:accent2>
+      <a:accent3>
+        <a:srgbClr val="A5A5A5"/>
+      </a:accent3>
+      <a:accent4>
+        <a:srgbClr val="FFC000"/>
+      </a:accent4>
+      <a:accent5>
+        <a:srgbClr val="4472C4"/>
+      </a:accent5>
+      <a:accent6>
+        <a:srgbClr val="70AD47"/>
+      </a:accent6>
+      <a:hlink>
+        <a:srgbClr val="0563C1"/>
+      </a:hlink>
+      <a:folHlink>
+        <a:srgbClr val="954F72"/>
+      </a:folHlink>
+    </a:clrScheme>
+    <a:fontScheme name="Office">
+      <a:majorFont>
+        <a:latin typeface="Calibri Light" panose="020F0302020204030204"/>
+        <a:ea typeface=""/>
+        <a:cs typeface=""/>
+        <a:font script="Jpan" typeface="ＭＳ Ｐゴシック"/>
+        <a:font script="Hang" typeface="맑은 고딕"/>
+        <a:font script="Hans" typeface="宋体"/>
+        <a:font script="Hant" typeface="新細明體"/>
+        <a:font script="Arab" typeface="Times New Roman"/>
+        <a:font script="Hebr" typeface="Times New Roman"/>
+        <a:font script="Thai" typeface="Angsana New"/>
+        <a:font script="Ethi" typeface="Nyala"/>
+        <a:font script="Beng" typeface="Vrinda"/>
+        <a:font script="Gujr" typeface="Shruti"/>
+        <a:font script="Khmr" typeface="MoolBoran"/>
+        <a:font script="Knda" typeface="Tunga"/>
+        <a:font script="Guru" typeface="Raavi"/>
+        <a:font script="Cans" typeface="Euphemia"/>
+        <a:font script="Cher" typeface="Plantagenet Cherokee"/>
+        <a:font script="Yiii" typeface="Microsoft Yi Baiti"/>
+        <a:font script="Tibt" typeface="Microsoft Himalaya"/>
+        <a:font script="Thaa" typeface="MV Boli"/>
+        <a:font script="Deva" typeface="Mangal"/>
+        <a:font script="Telu" typeface="Gautami"/>
+        <a:font script="Taml" typeface="Latha"/>
+        <a:font script="Syrc" typeface="Estrangelo Edessa"/>
+        <a:font script="Orya" typeface="Kalinga"/>
+        <a:font script="Mlym" typeface="Kartika"/>
+        <a:font script="Laoo" typeface="DokChampa"/>
+        <a:font script="Sinh" typeface="Iskoola Pota"/>
+        <a:font script="Mong" typeface="Mongolian Baiti"/>
+        <a:font script="Viet" typeface="Times New Roman"/>
+        <a:font script="Uigh" typeface="Microsoft Uighur"/>
+        <a:font script="Geor" typeface="Sylfaen"/>
+      </a:majorFont>
+      <a:minorFont>
+        <a:latin typeface="Calibri" panose="020F0502020204030204"/>
+        <a:ea typeface=""/>
+        <a:cs typeface=""/>
+        <a:font script="Jpan" typeface="ＭＳ Ｐゴシック"/>
+        <a:font script="Hang" typeface="맑은 고딕"/>
+        <a:font script="Hans" typeface="宋体"/>
+        <a:font script="Hant" typeface="新細明體"/>
+        <a:font script="Arab" typeface="Arial"/>
+        <a:font script="Hebr" typeface="Arial"/>
+        <a:font script="Thai" typeface="Cordia New"/>
+        <a:font script="Ethi" typeface="Nyala"/>
+        <a:font script="Beng" typeface="Vrinda"/>
+        <a:font script="Gujr" typeface="Shruti"/>
+        <a:font script="Khmr" typeface="DaunPenh"/>
+        <a:font script="Knda" typeface="Tunga"/>
+        <a:font script="Guru" typeface="Raavi"/>
+        <a:font script="Cans" typeface="Euphemia"/>
+        <a:font script="Cher" typeface="Plantagenet Cherokee"/>
+        <a:font script="Yiii" typeface="Microsoft Yi Baiti"/>
+        <a:font script="Tibt" typeface="Microsoft Himalaya"/>
+        <a:font script="Thaa" typeface="MV Boli"/>
+        <a:font script="Deva" typeface="Mangal"/>
+        <a:font script="Telu" typeface="Gautami"/>
+        <a:font script="Taml" typeface="Latha"/>
+        <a:font script="Syrc" typeface="Estrangelo Edessa"/>
+        <a:font script="Orya" typeface="Kalinga"/>
+        <a:font script="Mlym" typeface="Kartika"/>
+        <a:font script="Laoo" typeface="DokChampa"/>
+        <a:font script="Sinh" typeface="Iskoola Pota"/>
+        <a:font script="Mong" typeface="Mongolian Baiti"/>
+        <a:font script="Viet" typeface="Arial"/>
+        <a:font script="Uigh" typeface="Microsoft Uighur"/>
+        <a:font script="Geor" typeface="Sylfaen"/>
+      </a:minorFont>
+    </a:fontScheme>
+    <a:fmtScheme name="Office">
+      <a:fillStyleLst>
+        <a:solidFill>
+          <a:schemeClr val="phClr"/>
+        </a:solidFill>
+        <a:gradFill rotWithShape="1">
+          <a:gsLst>
+            <a:gs pos="0">
+              <a:schemeClr val="phClr">
+                <a:lumMod val="110000"/>
+                <a:satMod val="105000"/>
+                <a:tint val="67000"/>
+              </a:schemeClr>
+            </a:gs>
+            <a:gs pos="50000">
+              <a:schemeClr val="phClr">
+                <a:lumMod val="105000"/>
+                <a:satMod val="103000"/>
+                <a:tint val="73000"/>
+              </a:schemeClr>
+            </a:gs>
+            <a:gs pos="100000">
+              <a:schemeClr val="phClr">
+                <a:lumMod val="105000"/>
+                <a:satMod val="109000"/>
+                <a:tint val="81000"/>
+              </a:schemeClr>
+            </a:gs>
+          </a:gsLst>
+          <a:lin ang="5400000" scaled="0"/>
+        </a:gradFill>
+        <a:gradFill rotWithShape="1">
+          <a:gsLst>
+            <a:gs pos="0">
+              <a:schemeClr val="phClr">
+                <a:satMod val="103000"/>
+                <a:lumMod val="102000"/>
+                <a:tint val="94000"/>
+              </a:schemeClr>
+            </a:gs>
+            <a:gs pos="50000">
+              <a:schemeClr val="phClr">
+                <a:satMod val="110000"/>
+                <a:lumMod val="100000"/>
+                <a:shade val="100000"/>
+              </a:schemeClr>
+            </a:gs>
+            <a:gs pos="100000">
+              <a:schemeClr val="phClr">
+                <a:lumMod val="99000"/>
+                <a:satMod val="120000"/>
+                <a:shade val="78000"/>
+              </a:schemeClr>
+            </a:gs>
+          </a:gsLst>
+          <a:lin ang="5400000" scaled="0"/>
+        </a:gradFill>
+      </a:fillStyleLst>
+      <a:lnStyleLst>
+        <a:ln w="6350" cap="flat" cmpd="sng" algn="ctr">
+          <a:solidFill>
+            <a:schemeClr val="phClr"/>
+          </a:solidFill>
+          <a:prstDash val="solid"/>
+          <a:miter lim="800000"/>
+        </a:ln>
+        <a:ln w="12700" cap="flat" cmpd="sng" algn="ctr">
+          <a:solidFill>
+            <a:schemeClr val="phClr"/>
+          </a:solidFill>
+          <a:prstDash val="solid"/>
+          <a:miter lim="800000"/>
+        </a:ln>
+        <a:ln w="19050" cap="flat" cmpd="sng" algn="ctr">
+          <a:solidFill>
+            <a:schemeClr val="phClr"/>
+          </a:solidFill>
+          <a:prstDash val="solid"/>
+          <a:miter lim="800000"/>
+        </a:ln>
+      </a:lnStyleLst>
+      <a:effectStyleLst>
+        <a:effectStyle>
+          <a:effectLst/>
+        </a:effectStyle>
+        <a:effectStyle>
+          <a:effectLst/>
+        </a:effectStyle>
+        <a:effectStyle>
+          <a:effectLst>
+            <a:outerShdw blurRad="57150" dist="19050" dir="5400000" algn="ctr" rotWithShape="0">
+              <a:srgbClr val="000000">
+                <a:alpha val="63000"/>
+              </a:srgbClr>
+            </a:outerShdw>
+          </a:effectLst>
+        </a:effectStyle>
+      </a:effectStyleLst>
+      <a:bgFillStyleLst>
+        <a:solidFill>
+          <a:schemeClr val="phClr"/>
+        </a:solidFill>
+        <a:solidFill>
+          <a:schemeClr val="phClr">
+            <a:tint val="95000"/>
+            <a:satMod val="170000"/>
+          </a:schemeClr>
+        </a:solidFill>
+        <a:gradFill rotWithShape="1">
+          <a:gsLst>
+            <a:gs pos="0">
+              <a:schemeClr val="phClr">
+                <a:tint val="93000"/>
+                <a:satMod val="150000"/>
+                <a:shade val="98000"/>
+                <a:lumMod val="102000"/>
+              </a:schemeClr>
+            </a:gs>
+            <a:gs pos="50000">
+              <a:schemeClr val="phClr">
+                <a:tint val="98000"/>
+                <a:satMod val="130000"/>
+                <a:shade val="90000"/>
+                <a:lumMod val="103000"/>
+              </a:schemeClr>
+            </a:gs>
+            <a:gs pos="100000">
+              <a:schemeClr val="phClr">
+                <a:shade val="63000"/>
+                <a:satMod val="120000"/>
+              </a:schemeClr>
+            </a:gs>
+          </a:gsLst>
+          <a:lin ang="5400000" scaled="0"/>
+        </a:gradFill>
+      </a:bgFillStyleLst>
+    </a:fmtScheme>
+  </a:themeElements>
+  <a:objectDefaults/>
+  <a:extraClrSchemeLst/>
+  <a:extLst>
+    <a:ext uri="{05A4C25C-085E-4340-85A3-A5531E510DB2}">
+      <thm15:themeFamily xmlns:thm15="http://schemas.microsoft.com/office/thememl/2012/main" name="Office Theme" id="{62F939B6-93AF-4DB8-9C6B-D6C7DFDC589F}" vid="{4A3C46E8-61CC-4603-A589-7422A47A8E4A}"/>
+    </a:ext>
+  </a:extLst>
+</a:theme>
 </file>
</xml_diff>

<commit_message>
changed presentation title picture
</commit_message>
<xml_diff>
--- a/presentation/Sokonet.pptx
+++ b/presentation/Sokonet.pptx
@@ -130,6 +130,18 @@
 </p:presentation>
 </file>
 
+<file path=ppt/commentAuthors.xml><?xml version="1.0" encoding="utf-8"?>
+<p:cmAuthorLst xmlns:a="http://schemas.openxmlformats.org/drawingml/2006/main" xmlns:r="http://schemas.openxmlformats.org/officeDocument/2006/relationships" xmlns:p="http://schemas.openxmlformats.org/presentationml/2006/main">
+  <p:cmAuthor id="1" name="Christopher Browne" initials="CB" lastIdx="1" clrIdx="0">
+    <p:extLst>
+      <p:ext uri="{19B8F6BF-5375-455C-9EA6-DF929625EA0E}">
+        <p15:presenceInfo xmlns:p15="http://schemas.microsoft.com/office/powerpoint/2012/main" userId="b05ec2af4c0709da" providerId="Windows Live"/>
+      </p:ext>
+    </p:extLst>
+  </p:cmAuthor>
+</p:cmAuthorLst>
+</file>
+
 <file path=ppt/notesMasters/notesMaster1.xml><?xml version="1.0" encoding="utf-8"?>
 <p:notesMaster xmlns:a="http://schemas.openxmlformats.org/drawingml/2006/main" xmlns:r="http://schemas.openxmlformats.org/officeDocument/2006/relationships" xmlns:p="http://schemas.openxmlformats.org/presentationml/2006/main">
   <p:cSld>
@@ -555,6 +567,94 @@
     <p:extLst>
       <p:ext uri="{BB962C8B-B14F-4D97-AF65-F5344CB8AC3E}">
         <p14:creationId xmlns:p14="http://schemas.microsoft.com/office/powerpoint/2010/main" val="941034053"/>
+      </p:ext>
+    </p:extLst>
+  </p:cSld>
+  <p:clrMapOvr>
+    <a:masterClrMapping/>
+  </p:clrMapOvr>
+</p:notes>
+</file>
+
+<file path=ppt/notesSlides/notesSlide2.xml><?xml version="1.0" encoding="utf-8"?>
+<p:notes xmlns:a="http://schemas.openxmlformats.org/drawingml/2006/main" xmlns:r="http://schemas.openxmlformats.org/officeDocument/2006/relationships" xmlns:p="http://schemas.openxmlformats.org/presentationml/2006/main">
+  <p:cSld>
+    <p:spTree>
+      <p:nvGrpSpPr>
+        <p:cNvPr id="1" name=""/>
+        <p:cNvGrpSpPr/>
+        <p:nvPr/>
+      </p:nvGrpSpPr>
+      <p:grpSpPr>
+        <a:xfrm>
+          <a:off x="0" y="0"/>
+          <a:ext cx="0" cy="0"/>
+          <a:chOff x="0" y="0"/>
+          <a:chExt cx="0" cy="0"/>
+        </a:xfrm>
+      </p:grpSpPr>
+      <p:sp>
+        <p:nvSpPr>
+          <p:cNvPr id="2" name="Slide Image Placeholder 1"/>
+          <p:cNvSpPr>
+            <a:spLocks noGrp="1" noRot="1" noChangeAspect="1"/>
+          </p:cNvSpPr>
+          <p:nvPr>
+            <p:ph type="sldImg"/>
+          </p:nvPr>
+        </p:nvSpPr>
+        <p:spPr/>
+      </p:sp>
+      <p:sp>
+        <p:nvSpPr>
+          <p:cNvPr id="3" name="Notes Placeholder 2"/>
+          <p:cNvSpPr>
+            <a:spLocks noGrp="1"/>
+          </p:cNvSpPr>
+          <p:nvPr>
+            <p:ph type="body" idx="1"/>
+          </p:nvPr>
+        </p:nvSpPr>
+        <p:spPr/>
+        <p:txBody>
+          <a:bodyPr/>
+          <a:lstStyle/>
+          <a:p>
+            <a:r>
+              <a:rPr lang="fr-FR" dirty="0" smtClean="0"/>
+              <a:t>Macro -&gt; Composite</a:t>
+            </a:r>
+            <a:endParaRPr lang="fr-FR" dirty="0"/>
+          </a:p>
+        </p:txBody>
+      </p:sp>
+      <p:sp>
+        <p:nvSpPr>
+          <p:cNvPr id="4" name="Slide Number Placeholder 3"/>
+          <p:cNvSpPr>
+            <a:spLocks noGrp="1"/>
+          </p:cNvSpPr>
+          <p:nvPr>
+            <p:ph type="sldNum" sz="quarter" idx="10"/>
+          </p:nvPr>
+        </p:nvSpPr>
+        <p:spPr/>
+        <p:txBody>
+          <a:bodyPr/>
+          <a:lstStyle/>
+          <a:p>
+            <a:fld id="{2A8083D5-DE23-4A00-8EE9-F3D32EC15556}" type="slidenum">
+              <a:rPr lang="fr-FR" smtClean="0"/>
+              <a:t>11</a:t>
+            </a:fld>
+            <a:endParaRPr lang="fr-FR"/>
+          </a:p>
+        </p:txBody>
+      </p:sp>
+    </p:spTree>
+    <p:extLst>
+      <p:ext uri="{BB962C8B-B14F-4D97-AF65-F5344CB8AC3E}">
+        <p14:creationId xmlns:p14="http://schemas.microsoft.com/office/powerpoint/2010/main" val="2206404771"/>
       </p:ext>
     </p:extLst>
   </p:cSld>
@@ -4484,7 +4584,6 @@
               <a:rPr lang="fr-FR" dirty="0" smtClean="0"/>
               <a:t>traitement</a:t>
             </a:r>
-            <a:endParaRPr lang="fr-FR" dirty="0" smtClean="0"/>
           </a:p>
           <a:p>
             <a:r>
@@ -4493,15 +4592,7 @@
             </a:r>
             <a:r>
               <a:rPr lang="fr-FR" dirty="0" smtClean="0"/>
-              <a:t> </a:t>
-            </a:r>
-            <a:r>
-              <a:rPr lang="fr-FR" dirty="0" smtClean="0"/>
-              <a:t>et pattern « commande </a:t>
-            </a:r>
-            <a:r>
-              <a:rPr lang="fr-FR" dirty="0" smtClean="0"/>
-              <a:t>»</a:t>
+              <a:t> et pattern « commande »</a:t>
             </a:r>
           </a:p>
           <a:p>
@@ -4830,15 +4921,21 @@
           </p:nvPr>
         </p:nvPicPr>
         <p:blipFill>
-          <a:blip r:embed="rId2"/>
+          <a:blip r:embed="rId2">
+            <a:extLst>
+              <a:ext uri="{28A0092B-C50C-407E-A947-70E740481C1C}">
+                <a14:useLocalDpi xmlns:a14="http://schemas.microsoft.com/office/drawing/2010/main" val="0"/>
+              </a:ext>
+            </a:extLst>
+          </a:blip>
           <a:stretch>
             <a:fillRect/>
           </a:stretch>
         </p:blipFill>
         <p:spPr>
           <a:xfrm>
-            <a:off x="2144819" y="2580041"/>
-            <a:ext cx="4854361" cy="2842506"/>
+            <a:off x="1595122" y="1836420"/>
+            <a:ext cx="5953755" cy="4172867"/>
           </a:xfrm>
           <a:prstGeom prst="rect">
             <a:avLst/>

</xml_diff>